<commit_message>
PCA using climate data done
</commit_message>
<xml_diff>
--- a/landraces_classification/classification_algorithms/Landrace_Gap_Analysis-results.pptx
+++ b/landraces_classification/classification_algorithms/Landrace_Gap_Analysis-results.pptx
@@ -28,6 +28,11 @@
     <p:sldId id="276" r:id="rId22"/>
     <p:sldId id="277" r:id="rId23"/>
     <p:sldId id="265" r:id="rId24"/>
+    <p:sldId id="281" r:id="rId25"/>
+    <p:sldId id="282" r:id="rId26"/>
+    <p:sldId id="283" r:id="rId27"/>
+    <p:sldId id="284" r:id="rId28"/>
+    <p:sldId id="285" r:id="rId29"/>
   </p:sldIdLst>
   <p:sldSz cx="12192000" cy="6858000"/>
   <p:notesSz cx="6858000" cy="9144000"/>
@@ -265,7 +270,7 @@
           <a:p>
             <a:fld id="{C85E124E-CF58-40F0-9C4F-2B3D888B935B}" type="datetimeFigureOut">
               <a:rPr lang="es-CO" smtClean="0"/>
-              <a:t>02/10/2017</a:t>
+              <a:t>05/10/2017</a:t>
             </a:fld>
             <a:endParaRPr lang="es-CO"/>
           </a:p>
@@ -435,7 +440,7 @@
           <a:p>
             <a:fld id="{C85E124E-CF58-40F0-9C4F-2B3D888B935B}" type="datetimeFigureOut">
               <a:rPr lang="es-CO" smtClean="0"/>
-              <a:t>02/10/2017</a:t>
+              <a:t>05/10/2017</a:t>
             </a:fld>
             <a:endParaRPr lang="es-CO"/>
           </a:p>
@@ -615,7 +620,7 @@
           <a:p>
             <a:fld id="{C85E124E-CF58-40F0-9C4F-2B3D888B935B}" type="datetimeFigureOut">
               <a:rPr lang="es-CO" smtClean="0"/>
-              <a:t>02/10/2017</a:t>
+              <a:t>05/10/2017</a:t>
             </a:fld>
             <a:endParaRPr lang="es-CO"/>
           </a:p>
@@ -785,7 +790,7 @@
           <a:p>
             <a:fld id="{C85E124E-CF58-40F0-9C4F-2B3D888B935B}" type="datetimeFigureOut">
               <a:rPr lang="es-CO" smtClean="0"/>
-              <a:t>02/10/2017</a:t>
+              <a:t>05/10/2017</a:t>
             </a:fld>
             <a:endParaRPr lang="es-CO"/>
           </a:p>
@@ -1031,7 +1036,7 @@
           <a:p>
             <a:fld id="{C85E124E-CF58-40F0-9C4F-2B3D888B935B}" type="datetimeFigureOut">
               <a:rPr lang="es-CO" smtClean="0"/>
-              <a:t>02/10/2017</a:t>
+              <a:t>05/10/2017</a:t>
             </a:fld>
             <a:endParaRPr lang="es-CO"/>
           </a:p>
@@ -1263,7 +1268,7 @@
           <a:p>
             <a:fld id="{C85E124E-CF58-40F0-9C4F-2B3D888B935B}" type="datetimeFigureOut">
               <a:rPr lang="es-CO" smtClean="0"/>
-              <a:t>02/10/2017</a:t>
+              <a:t>05/10/2017</a:t>
             </a:fld>
             <a:endParaRPr lang="es-CO"/>
           </a:p>
@@ -1630,7 +1635,7 @@
           <a:p>
             <a:fld id="{C85E124E-CF58-40F0-9C4F-2B3D888B935B}" type="datetimeFigureOut">
               <a:rPr lang="es-CO" smtClean="0"/>
-              <a:t>02/10/2017</a:t>
+              <a:t>05/10/2017</a:t>
             </a:fld>
             <a:endParaRPr lang="es-CO"/>
           </a:p>
@@ -1748,7 +1753,7 @@
           <a:p>
             <a:fld id="{C85E124E-CF58-40F0-9C4F-2B3D888B935B}" type="datetimeFigureOut">
               <a:rPr lang="es-CO" smtClean="0"/>
-              <a:t>02/10/2017</a:t>
+              <a:t>05/10/2017</a:t>
             </a:fld>
             <a:endParaRPr lang="es-CO"/>
           </a:p>
@@ -1843,7 +1848,7 @@
           <a:p>
             <a:fld id="{C85E124E-CF58-40F0-9C4F-2B3D888B935B}" type="datetimeFigureOut">
               <a:rPr lang="es-CO" smtClean="0"/>
-              <a:t>02/10/2017</a:t>
+              <a:t>05/10/2017</a:t>
             </a:fld>
             <a:endParaRPr lang="es-CO"/>
           </a:p>
@@ -2120,7 +2125,7 @@
           <a:p>
             <a:fld id="{C85E124E-CF58-40F0-9C4F-2B3D888B935B}" type="datetimeFigureOut">
               <a:rPr lang="es-CO" smtClean="0"/>
-              <a:t>02/10/2017</a:t>
+              <a:t>05/10/2017</a:t>
             </a:fld>
             <a:endParaRPr lang="es-CO"/>
           </a:p>
@@ -2373,7 +2378,7 @@
           <a:p>
             <a:fld id="{C85E124E-CF58-40F0-9C4F-2B3D888B935B}" type="datetimeFigureOut">
               <a:rPr lang="es-CO" smtClean="0"/>
-              <a:t>02/10/2017</a:t>
+              <a:t>05/10/2017</a:t>
             </a:fld>
             <a:endParaRPr lang="es-CO"/>
           </a:p>
@@ -2586,7 +2591,7 @@
           <a:p>
             <a:fld id="{C85E124E-CF58-40F0-9C4F-2B3D888B935B}" type="datetimeFigureOut">
               <a:rPr lang="es-CO" smtClean="0"/>
-              <a:t>02/10/2017</a:t>
+              <a:t>05/10/2017</a:t>
             </a:fld>
             <a:endParaRPr lang="es-CO"/>
           </a:p>
@@ -4681,18 +4686,14 @@
           <a:p>
             <a:r>
               <a:rPr lang="en-US" b="1" dirty="0" smtClean="0"/>
-              <a:t>Altitude data distribution </a:t>
-            </a:r>
-            <a:r>
-              <a:rPr lang="en-US" b="1" dirty="0" smtClean="0"/>
-              <a:t>from SRTM</a:t>
+              <a:t>Altitude data distribution from SRTM</a:t>
             </a:r>
             <a:endParaRPr lang="es-CO" b="1" dirty="0"/>
           </a:p>
         </p:txBody>
       </p:sp>
-      <mc:AlternateContent xmlns:mc="http://schemas.openxmlformats.org/markup-compatibility/2006">
-        <mc:Choice xmlns:a14="http://schemas.microsoft.com/office/drawing/2010/main" Requires="a14">
+      <mc:AlternateContent xmlns:mc="http://schemas.openxmlformats.org/markup-compatibility/2006" xmlns:a14="http://schemas.microsoft.com/office/drawing/2010/main">
+        <mc:Choice Requires="a14">
           <p:sp>
             <p:nvSpPr>
               <p:cNvPr id="7" name="TextBox 6"/>
@@ -4772,7 +4773,7 @@
             </p:txBody>
           </p:sp>
         </mc:Choice>
-        <mc:Fallback>
+        <mc:Fallback xmlns="">
           <p:sp>
             <p:nvSpPr>
               <p:cNvPr id="7" name="TextBox 6"/>
@@ -4811,8 +4812,8 @@
           </p:sp>
         </mc:Fallback>
       </mc:AlternateContent>
-      <mc:AlternateContent xmlns:mc="http://schemas.openxmlformats.org/markup-compatibility/2006">
-        <mc:Choice xmlns:a14="http://schemas.microsoft.com/office/drawing/2010/main" Requires="a14">
+      <mc:AlternateContent xmlns:mc="http://schemas.openxmlformats.org/markup-compatibility/2006" xmlns:a14="http://schemas.microsoft.com/office/drawing/2010/main">
+        <mc:Choice Requires="a14">
           <p:sp>
             <p:nvSpPr>
               <p:cNvPr id="8" name="TextBox 7"/>
@@ -4892,7 +4893,7 @@
             </p:txBody>
           </p:sp>
         </mc:Choice>
-        <mc:Fallback>
+        <mc:Fallback xmlns="">
           <p:sp>
             <p:nvSpPr>
               <p:cNvPr id="8" name="TextBox 7"/>
@@ -5419,6 +5420,374 @@
     <p:extLst>
       <p:ext uri="{BB962C8B-B14F-4D97-AF65-F5344CB8AC3E}">
         <p14:creationId xmlns:p14="http://schemas.microsoft.com/office/powerpoint/2010/main" val="1039304946"/>
+      </p:ext>
+    </p:extLst>
+  </p:cSld>
+  <p:clrMapOvr>
+    <a:masterClrMapping/>
+  </p:clrMapOvr>
+  <p:timing>
+    <p:tnLst>
+      <p:par>
+        <p:cTn id="1" dur="indefinite" restart="never" nodeType="tmRoot"/>
+      </p:par>
+    </p:tnLst>
+  </p:timing>
+</p:sld>
+</file>
+
+<file path=ppt/slides/slide24.xml><?xml version="1.0" encoding="utf-8"?>
+<p:sld xmlns:a="http://schemas.openxmlformats.org/drawingml/2006/main" xmlns:r="http://schemas.openxmlformats.org/officeDocument/2006/relationships" xmlns:p="http://schemas.openxmlformats.org/presentationml/2006/main">
+  <p:cSld>
+    <p:spTree>
+      <p:nvGrpSpPr>
+        <p:cNvPr id="1" name=""/>
+        <p:cNvGrpSpPr/>
+        <p:nvPr/>
+      </p:nvGrpSpPr>
+      <p:grpSpPr>
+        <a:xfrm>
+          <a:off x="0" y="0"/>
+          <a:ext cx="0" cy="0"/>
+          <a:chOff x="0" y="0"/>
+          <a:chExt cx="0" cy="0"/>
+        </a:xfrm>
+      </p:grpSpPr>
+      <p:sp>
+        <p:nvSpPr>
+          <p:cNvPr id="2" name="Title 1"/>
+          <p:cNvSpPr>
+            <a:spLocks noGrp="1"/>
+          </p:cNvSpPr>
+          <p:nvPr>
+            <p:ph type="ctrTitle"/>
+          </p:nvPr>
+        </p:nvSpPr>
+        <p:spPr/>
+        <p:txBody>
+          <a:bodyPr/>
+          <a:lstStyle/>
+          <a:p>
+            <a:r>
+              <a:rPr lang="en-US" dirty="0" smtClean="0"/>
+              <a:t>PCA </a:t>
+            </a:r>
+            <a:r>
+              <a:rPr lang="en-US" dirty="0" smtClean="0"/>
+              <a:t>analysis</a:t>
+            </a:r>
+            <a:endParaRPr lang="es-CO" dirty="0"/>
+          </a:p>
+        </p:txBody>
+      </p:sp>
+    </p:spTree>
+    <p:extLst>
+      <p:ext uri="{BB962C8B-B14F-4D97-AF65-F5344CB8AC3E}">
+        <p14:creationId xmlns:p14="http://schemas.microsoft.com/office/powerpoint/2010/main" val="2750737906"/>
+      </p:ext>
+    </p:extLst>
+  </p:cSld>
+  <p:clrMapOvr>
+    <a:masterClrMapping/>
+  </p:clrMapOvr>
+  <p:timing>
+    <p:tnLst>
+      <p:par>
+        <p:cTn id="1" dur="indefinite" restart="never" nodeType="tmRoot"/>
+      </p:par>
+    </p:tnLst>
+  </p:timing>
+</p:sld>
+</file>
+
+<file path=ppt/slides/slide25.xml><?xml version="1.0" encoding="utf-8"?>
+<p:sld xmlns:a="http://schemas.openxmlformats.org/drawingml/2006/main" xmlns:r="http://schemas.openxmlformats.org/officeDocument/2006/relationships" xmlns:p="http://schemas.openxmlformats.org/presentationml/2006/main">
+  <p:cSld>
+    <p:spTree>
+      <p:nvGrpSpPr>
+        <p:cNvPr id="1" name=""/>
+        <p:cNvGrpSpPr/>
+        <p:nvPr/>
+      </p:nvGrpSpPr>
+      <p:grpSpPr>
+        <a:xfrm>
+          <a:off x="0" y="0"/>
+          <a:ext cx="0" cy="0"/>
+          <a:chOff x="0" y="0"/>
+          <a:chExt cx="0" cy="0"/>
+        </a:xfrm>
+      </p:grpSpPr>
+      <p:pic>
+        <p:nvPicPr>
+          <p:cNvPr id="4" name="Picture 3"/>
+          <p:cNvPicPr>
+            <a:picLocks noChangeAspect="1"/>
+          </p:cNvPicPr>
+          <p:nvPr/>
+        </p:nvPicPr>
+        <p:blipFill>
+          <a:blip r:embed="rId2"/>
+          <a:stretch>
+            <a:fillRect/>
+          </a:stretch>
+        </p:blipFill>
+        <p:spPr>
+          <a:xfrm>
+            <a:off x="2794921" y="0"/>
+            <a:ext cx="6602158" cy="6858000"/>
+          </a:xfrm>
+          <a:prstGeom prst="rect">
+            <a:avLst/>
+          </a:prstGeom>
+        </p:spPr>
+      </p:pic>
+    </p:spTree>
+    <p:extLst>
+      <p:ext uri="{BB962C8B-B14F-4D97-AF65-F5344CB8AC3E}">
+        <p14:creationId xmlns:p14="http://schemas.microsoft.com/office/powerpoint/2010/main" val="4048351782"/>
+      </p:ext>
+    </p:extLst>
+  </p:cSld>
+  <p:clrMapOvr>
+    <a:masterClrMapping/>
+  </p:clrMapOvr>
+  <p:timing>
+    <p:tnLst>
+      <p:par>
+        <p:cTn id="1" dur="indefinite" restart="never" nodeType="tmRoot"/>
+      </p:par>
+    </p:tnLst>
+  </p:timing>
+</p:sld>
+</file>
+
+<file path=ppt/slides/slide26.xml><?xml version="1.0" encoding="utf-8"?>
+<p:sld xmlns:a="http://schemas.openxmlformats.org/drawingml/2006/main" xmlns:r="http://schemas.openxmlformats.org/officeDocument/2006/relationships" xmlns:p="http://schemas.openxmlformats.org/presentationml/2006/main">
+  <p:cSld>
+    <p:spTree>
+      <p:nvGrpSpPr>
+        <p:cNvPr id="1" name=""/>
+        <p:cNvGrpSpPr/>
+        <p:nvPr/>
+      </p:nvGrpSpPr>
+      <p:grpSpPr>
+        <a:xfrm>
+          <a:off x="0" y="0"/>
+          <a:ext cx="0" cy="0"/>
+          <a:chOff x="0" y="0"/>
+          <a:chExt cx="0" cy="0"/>
+        </a:xfrm>
+      </p:grpSpPr>
+      <p:pic>
+        <p:nvPicPr>
+          <p:cNvPr id="2" name="Picture 1"/>
+          <p:cNvPicPr>
+            <a:picLocks noChangeAspect="1"/>
+          </p:cNvPicPr>
+          <p:nvPr/>
+        </p:nvPicPr>
+        <p:blipFill>
+          <a:blip r:embed="rId2"/>
+          <a:stretch>
+            <a:fillRect/>
+          </a:stretch>
+        </p:blipFill>
+        <p:spPr>
+          <a:xfrm>
+            <a:off x="0" y="85496"/>
+            <a:ext cx="12192000" cy="6687007"/>
+          </a:xfrm>
+          <a:prstGeom prst="rect">
+            <a:avLst/>
+          </a:prstGeom>
+        </p:spPr>
+      </p:pic>
+    </p:spTree>
+    <p:extLst>
+      <p:ext uri="{BB962C8B-B14F-4D97-AF65-F5344CB8AC3E}">
+        <p14:creationId xmlns:p14="http://schemas.microsoft.com/office/powerpoint/2010/main" val="3469411157"/>
+      </p:ext>
+    </p:extLst>
+  </p:cSld>
+  <p:clrMapOvr>
+    <a:masterClrMapping/>
+  </p:clrMapOvr>
+  <p:timing>
+    <p:tnLst>
+      <p:par>
+        <p:cTn id="1" dur="indefinite" restart="never" nodeType="tmRoot"/>
+      </p:par>
+    </p:tnLst>
+  </p:timing>
+</p:sld>
+</file>
+
+<file path=ppt/slides/slide27.xml><?xml version="1.0" encoding="utf-8"?>
+<p:sld xmlns:a="http://schemas.openxmlformats.org/drawingml/2006/main" xmlns:r="http://schemas.openxmlformats.org/officeDocument/2006/relationships" xmlns:p="http://schemas.openxmlformats.org/presentationml/2006/main">
+  <p:cSld>
+    <p:spTree>
+      <p:nvGrpSpPr>
+        <p:cNvPr id="1" name=""/>
+        <p:cNvGrpSpPr/>
+        <p:nvPr/>
+      </p:nvGrpSpPr>
+      <p:grpSpPr>
+        <a:xfrm>
+          <a:off x="0" y="0"/>
+          <a:ext cx="0" cy="0"/>
+          <a:chOff x="0" y="0"/>
+          <a:chExt cx="0" cy="0"/>
+        </a:xfrm>
+      </p:grpSpPr>
+      <p:pic>
+        <p:nvPicPr>
+          <p:cNvPr id="2" name="Picture 1"/>
+          <p:cNvPicPr>
+            <a:picLocks noChangeAspect="1"/>
+          </p:cNvPicPr>
+          <p:nvPr/>
+        </p:nvPicPr>
+        <p:blipFill>
+          <a:blip r:embed="rId2"/>
+          <a:stretch>
+            <a:fillRect/>
+          </a:stretch>
+        </p:blipFill>
+        <p:spPr>
+          <a:xfrm>
+            <a:off x="0" y="785004"/>
+            <a:ext cx="5604462" cy="5486400"/>
+          </a:xfrm>
+          <a:prstGeom prst="rect">
+            <a:avLst/>
+          </a:prstGeom>
+        </p:spPr>
+      </p:pic>
+      <p:sp>
+        <p:nvSpPr>
+          <p:cNvPr id="3" name="TextBox 2"/>
+          <p:cNvSpPr txBox="1"/>
+          <p:nvPr/>
+        </p:nvSpPr>
+        <p:spPr>
+          <a:xfrm>
+            <a:off x="2017432" y="6383547"/>
+            <a:ext cx="1569597" cy="369332"/>
+          </a:xfrm>
+          <a:prstGeom prst="rect">
+            <a:avLst/>
+          </a:prstGeom>
+          <a:noFill/>
+        </p:spPr>
+        <p:txBody>
+          <a:bodyPr wrap="none" rtlCol="0">
+            <a:spAutoFit/>
+          </a:bodyPr>
+          <a:lstStyle/>
+          <a:p>
+            <a:r>
+              <a:rPr lang="en-US" dirty="0" smtClean="0"/>
+              <a:t>Perplexity = 30</a:t>
+            </a:r>
+            <a:endParaRPr lang="es-CO" dirty="0"/>
+          </a:p>
+        </p:txBody>
+      </p:sp>
+      <p:pic>
+        <p:nvPicPr>
+          <p:cNvPr id="4" name="Picture 3"/>
+          <p:cNvPicPr>
+            <a:picLocks noChangeAspect="1"/>
+          </p:cNvPicPr>
+          <p:nvPr/>
+        </p:nvPicPr>
+        <p:blipFill>
+          <a:blip r:embed="rId3"/>
+          <a:stretch>
+            <a:fillRect/>
+          </a:stretch>
+        </p:blipFill>
+        <p:spPr>
+          <a:xfrm>
+            <a:off x="6044230" y="785004"/>
+            <a:ext cx="5493318" cy="5486400"/>
+          </a:xfrm>
+          <a:prstGeom prst="rect">
+            <a:avLst/>
+          </a:prstGeom>
+        </p:spPr>
+      </p:pic>
+      <p:sp>
+        <p:nvSpPr>
+          <p:cNvPr id="5" name="TextBox 4"/>
+          <p:cNvSpPr txBox="1"/>
+          <p:nvPr/>
+        </p:nvSpPr>
+        <p:spPr>
+          <a:xfrm>
+            <a:off x="8006090" y="6383547"/>
+            <a:ext cx="1569597" cy="369332"/>
+          </a:xfrm>
+          <a:prstGeom prst="rect">
+            <a:avLst/>
+          </a:prstGeom>
+          <a:noFill/>
+        </p:spPr>
+        <p:txBody>
+          <a:bodyPr wrap="none" rtlCol="0">
+            <a:spAutoFit/>
+          </a:bodyPr>
+          <a:lstStyle/>
+          <a:p>
+            <a:r>
+              <a:rPr lang="en-US" dirty="0" smtClean="0"/>
+              <a:t>Perplexity = 50</a:t>
+            </a:r>
+            <a:endParaRPr lang="es-CO" dirty="0"/>
+          </a:p>
+        </p:txBody>
+      </p:sp>
+    </p:spTree>
+    <p:extLst>
+      <p:ext uri="{BB962C8B-B14F-4D97-AF65-F5344CB8AC3E}">
+        <p14:creationId xmlns:p14="http://schemas.microsoft.com/office/powerpoint/2010/main" val="3536315812"/>
+      </p:ext>
+    </p:extLst>
+  </p:cSld>
+  <p:clrMapOvr>
+    <a:masterClrMapping/>
+  </p:clrMapOvr>
+  <p:timing>
+    <p:tnLst>
+      <p:par>
+        <p:cTn id="1" dur="indefinite" restart="never" nodeType="tmRoot"/>
+      </p:par>
+    </p:tnLst>
+  </p:timing>
+</p:sld>
+</file>
+
+<file path=ppt/slides/slide28.xml><?xml version="1.0" encoding="utf-8"?>
+<p:sld xmlns:a="http://schemas.openxmlformats.org/drawingml/2006/main" xmlns:r="http://schemas.openxmlformats.org/officeDocument/2006/relationships" xmlns:p="http://schemas.openxmlformats.org/presentationml/2006/main">
+  <p:cSld>
+    <p:spTree>
+      <p:nvGrpSpPr>
+        <p:cNvPr id="1" name=""/>
+        <p:cNvGrpSpPr/>
+        <p:nvPr/>
+      </p:nvGrpSpPr>
+      <p:grpSpPr>
+        <a:xfrm>
+          <a:off x="0" y="0"/>
+          <a:ext cx="0" cy="0"/>
+          <a:chOff x="0" y="0"/>
+          <a:chExt cx="0" cy="0"/>
+        </a:xfrm>
+      </p:grpSpPr>
+    </p:spTree>
+    <p:extLst>
+      <p:ext uri="{BB962C8B-B14F-4D97-AF65-F5344CB8AC3E}">
+        <p14:creationId xmlns:p14="http://schemas.microsoft.com/office/powerpoint/2010/main" val="1273158641"/>
       </p:ext>
     </p:extLst>
   </p:cSld>

</xml_diff>